<commit_message>
updated slides; converted pdfs
</commit_message>
<xml_diff>
--- a/ppt/CPL16-Hangfire.pptx
+++ b/ppt/CPL16-Hangfire.pptx
@@ -423,7 +423,7 @@
           <a:p>
             <a:fld id="{C8ADBDD7-D6D5-451D-A373-6B68E03C3743}" type="datetimeFigureOut">
               <a:rPr lang="en-US" smtClean="0"/>
-              <a:t>3/27/2016</a:t>
+              <a:t>3/28/2016</a:t>
             </a:fld>
             <a:endParaRPr lang="en-US"/>
           </a:p>
@@ -588,7 +588,7 @@
           <a:p>
             <a:fld id="{EC13577B-6902-467D-A26C-08A0DD5E4E03}" type="datetimeFigureOut">
               <a:rPr lang="en-US" smtClean="0"/>
-              <a:t>3/27/2016</a:t>
+              <a:t>3/28/2016</a:t>
             </a:fld>
             <a:endParaRPr lang="en-US"/>
           </a:p>
@@ -5231,7 +5231,7 @@
           <a:p>
             <a:fld id="{8BEEBAAA-29B5-4AF5-BC5F-7E580C29002D}" type="datetimeFigureOut">
               <a:rPr lang="en-US" smtClean="0"/>
-              <a:t>3/27/2016</a:t>
+              <a:t>3/28/2016</a:t>
             </a:fld>
             <a:endParaRPr lang="en-US"/>
           </a:p>
@@ -5748,7 +5748,7 @@
           <a:p>
             <a:fld id="{8BEEBAAA-29B5-4AF5-BC5F-7E580C29002D}" type="datetimeFigureOut">
               <a:rPr lang="en-US" smtClean="0"/>
-              <a:t>3/27/2016</a:t>
+              <a:t>3/28/2016</a:t>
             </a:fld>
             <a:endParaRPr lang="en-US"/>
           </a:p>
@@ -5957,7 +5957,7 @@
           <a:p>
             <a:fld id="{8BEEBAAA-29B5-4AF5-BC5F-7E580C29002D}" type="datetimeFigureOut">
               <a:rPr lang="en-US" smtClean="0"/>
-              <a:t>3/27/2016</a:t>
+              <a:t>3/28/2016</a:t>
             </a:fld>
             <a:endParaRPr lang="en-US"/>
           </a:p>
@@ -6297,7 +6297,7 @@
           <a:p>
             <a:fld id="{8BEEBAAA-29B5-4AF5-BC5F-7E580C29002D}" type="datetimeFigureOut">
               <a:rPr lang="en-US" smtClean="0"/>
-              <a:t>3/27/2016</a:t>
+              <a:t>3/28/2016</a:t>
             </a:fld>
             <a:endParaRPr lang="en-US"/>
           </a:p>
@@ -6548,7 +6548,7 @@
           <a:p>
             <a:fld id="{8BEEBAAA-29B5-4AF5-BC5F-7E580C29002D}" type="datetimeFigureOut">
               <a:rPr lang="en-US" smtClean="0"/>
-              <a:t>3/27/2016</a:t>
+              <a:t>3/28/2016</a:t>
             </a:fld>
             <a:endParaRPr lang="en-US"/>
           </a:p>
@@ -6871,7 +6871,7 @@
           <a:p>
             <a:fld id="{8BEEBAAA-29B5-4AF5-BC5F-7E580C29002D}" type="datetimeFigureOut">
               <a:rPr lang="en-US" smtClean="0"/>
-              <a:t>3/27/2016</a:t>
+              <a:t>3/28/2016</a:t>
             </a:fld>
             <a:endParaRPr lang="en-US"/>
           </a:p>
@@ -7060,7 +7060,7 @@
           <a:p>
             <a:fld id="{8BEEBAAA-29B5-4AF5-BC5F-7E580C29002D}" type="datetimeFigureOut">
               <a:rPr lang="en-US" smtClean="0"/>
-              <a:t>3/27/2016</a:t>
+              <a:t>3/28/2016</a:t>
             </a:fld>
             <a:endParaRPr lang="en-US"/>
           </a:p>
@@ -7426,7 +7426,7 @@
           <a:p>
             <a:fld id="{8BEEBAAA-29B5-4AF5-BC5F-7E580C29002D}" type="datetimeFigureOut">
               <a:rPr lang="en-US" smtClean="0"/>
-              <a:t>3/27/2016</a:t>
+              <a:t>3/28/2016</a:t>
             </a:fld>
             <a:endParaRPr lang="en-US"/>
           </a:p>
@@ -7863,7 +7863,7 @@
           <a:p>
             <a:fld id="{8BEEBAAA-29B5-4AF5-BC5F-7E580C29002D}" type="datetimeFigureOut">
               <a:rPr lang="en-US" smtClean="0"/>
-              <a:t>3/27/2016</a:t>
+              <a:t>3/28/2016</a:t>
             </a:fld>
             <a:endParaRPr lang="en-US"/>
           </a:p>
@@ -8844,7 +8844,7 @@
           <a:p>
             <a:fld id="{8BEEBAAA-29B5-4AF5-BC5F-7E580C29002D}" type="datetimeFigureOut">
               <a:rPr lang="en-US" smtClean="0"/>
-              <a:t>3/27/2016</a:t>
+              <a:t>3/28/2016</a:t>
             </a:fld>
             <a:endParaRPr lang="en-US"/>
           </a:p>
@@ -9786,7 +9786,7 @@
             <a:fld id="{8BEEBAAA-29B5-4AF5-BC5F-7E580C29002D}" type="datetimeFigureOut">
               <a:rPr lang="en-US" smtClean="0"/>
               <a:pPr/>
-              <a:t>3/27/2016</a:t>
+              <a:t>3/28/2016</a:t>
             </a:fld>
             <a:endParaRPr lang="en-US" dirty="0"/>
           </a:p>
@@ -10084,7 +10084,7 @@
             <a:fld id="{8BEEBAAA-29B5-4AF5-BC5F-7E580C29002D}" type="datetimeFigureOut">
               <a:rPr lang="en-US" smtClean="0"/>
               <a:pPr/>
-              <a:t>3/27/2016</a:t>
+              <a:t>3/28/2016</a:t>
             </a:fld>
             <a:endParaRPr lang="en-US" dirty="0"/>
           </a:p>
@@ -10373,7 +10373,7 @@
           <a:p>
             <a:fld id="{8BEEBAAA-29B5-4AF5-BC5F-7E580C29002D}" type="datetimeFigureOut">
               <a:rPr lang="en-US" smtClean="0"/>
-              <a:t>3/27/2016</a:t>
+              <a:t>3/28/2016</a:t>
             </a:fld>
             <a:endParaRPr lang="en-US"/>
           </a:p>
@@ -10999,7 +10999,7 @@
           <a:p>
             <a:fld id="{8BEEBAAA-29B5-4AF5-BC5F-7E580C29002D}" type="datetimeFigureOut">
               <a:rPr lang="en-US" smtClean="0"/>
-              <a:t>3/27/2016</a:t>
+              <a:t>3/28/2016</a:t>
             </a:fld>
             <a:endParaRPr lang="en-US"/>
           </a:p>
@@ -11532,7 +11532,7 @@
           <a:p>
             <a:fld id="{8BEEBAAA-29B5-4AF5-BC5F-7E580C29002D}" type="datetimeFigureOut">
               <a:rPr lang="en-US" smtClean="0"/>
-              <a:t>3/27/2016</a:t>
+              <a:t>3/28/2016</a:t>
             </a:fld>
             <a:endParaRPr lang="en-US"/>
           </a:p>
@@ -16167,238 +16167,6 @@
       <p:transition spd="slow" advClick="0"/>
     </mc:Fallback>
   </mc:AlternateContent>
-  <p:timing>
-    <p:tnLst>
-      <p:par>
-        <p:cTn id="1" dur="indefinite" restart="never" nodeType="tmRoot">
-          <p:childTnLst>
-            <p:seq concurrent="1" nextAc="seek">
-              <p:cTn id="2" dur="indefinite" nodeType="mainSeq">
-                <p:childTnLst>
-                  <p:par>
-                    <p:cTn id="3" fill="hold">
-                      <p:stCondLst>
-                        <p:cond delay="indefinite"/>
-                      </p:stCondLst>
-                      <p:childTnLst>
-                        <p:par>
-                          <p:cTn id="4" fill="hold">
-                            <p:stCondLst>
-                              <p:cond delay="0"/>
-                            </p:stCondLst>
-                            <p:childTnLst>
-                              <p:par>
-                                <p:cTn id="5" presetID="3" presetClass="emph" presetSubtype="2" fill="hold" nodeType="clickEffect">
-                                  <p:stCondLst>
-                                    <p:cond delay="0"/>
-                                  </p:stCondLst>
-                                  <p:childTnLst>
-                                    <p:animClr clrSpc="rgb" dir="cw">
-                                      <p:cBhvr override="childStyle">
-                                        <p:cTn id="6" dur="2000" fill="hold"/>
-                                        <p:tgtEl>
-                                          <p:spTgt spid="2">
-                                            <p:txEl>
-                                              <p:pRg st="1" end="1"/>
-                                            </p:txEl>
-                                          </p:spTgt>
-                                        </p:tgtEl>
-                                        <p:attrNameLst>
-                                          <p:attrName>style.color</p:attrName>
-                                        </p:attrNameLst>
-                                      </p:cBhvr>
-                                      <p:to>
-                                        <a:schemeClr val="bg2"/>
-                                      </p:to>
-                                    </p:animClr>
-                                  </p:childTnLst>
-                                </p:cTn>
-                              </p:par>
-                              <p:par>
-                                <p:cTn id="7" presetID="3" presetClass="emph" presetSubtype="2" fill="hold" nodeType="withEffect">
-                                  <p:stCondLst>
-                                    <p:cond delay="0"/>
-                                  </p:stCondLst>
-                                  <p:childTnLst>
-                                    <p:animClr clrSpc="rgb" dir="cw">
-                                      <p:cBhvr override="childStyle">
-                                        <p:cTn id="8" dur="2000" fill="hold"/>
-                                        <p:tgtEl>
-                                          <p:spTgt spid="2">
-                                            <p:txEl>
-                                              <p:pRg st="2" end="2"/>
-                                            </p:txEl>
-                                          </p:spTgt>
-                                        </p:tgtEl>
-                                        <p:attrNameLst>
-                                          <p:attrName>style.color</p:attrName>
-                                        </p:attrNameLst>
-                                      </p:cBhvr>
-                                      <p:to>
-                                        <a:schemeClr val="bg2"/>
-                                      </p:to>
-                                    </p:animClr>
-                                  </p:childTnLst>
-                                </p:cTn>
-                              </p:par>
-                              <p:par>
-                                <p:cTn id="9" presetID="3" presetClass="emph" presetSubtype="2" fill="hold" nodeType="withEffect">
-                                  <p:stCondLst>
-                                    <p:cond delay="0"/>
-                                  </p:stCondLst>
-                                  <p:childTnLst>
-                                    <p:animClr clrSpc="rgb" dir="cw">
-                                      <p:cBhvr override="childStyle">
-                                        <p:cTn id="10" dur="2000" fill="hold"/>
-                                        <p:tgtEl>
-                                          <p:spTgt spid="2">
-                                            <p:txEl>
-                                              <p:pRg st="3" end="3"/>
-                                            </p:txEl>
-                                          </p:spTgt>
-                                        </p:tgtEl>
-                                        <p:attrNameLst>
-                                          <p:attrName>style.color</p:attrName>
-                                        </p:attrNameLst>
-                                      </p:cBhvr>
-                                      <p:to>
-                                        <a:schemeClr val="bg2"/>
-                                      </p:to>
-                                    </p:animClr>
-                                  </p:childTnLst>
-                                </p:cTn>
-                              </p:par>
-                              <p:par>
-                                <p:cTn id="11" presetID="3" presetClass="emph" presetSubtype="2" fill="hold" nodeType="withEffect">
-                                  <p:stCondLst>
-                                    <p:cond delay="0"/>
-                                  </p:stCondLst>
-                                  <p:childTnLst>
-                                    <p:animClr clrSpc="rgb" dir="cw">
-                                      <p:cBhvr override="childStyle">
-                                        <p:cTn id="12" dur="2000" fill="hold"/>
-                                        <p:tgtEl>
-                                          <p:spTgt spid="2">
-                                            <p:txEl>
-                                              <p:pRg st="4" end="4"/>
-                                            </p:txEl>
-                                          </p:spTgt>
-                                        </p:tgtEl>
-                                        <p:attrNameLst>
-                                          <p:attrName>style.color</p:attrName>
-                                        </p:attrNameLst>
-                                      </p:cBhvr>
-                                      <p:to>
-                                        <a:schemeClr val="bg2"/>
-                                      </p:to>
-                                    </p:animClr>
-                                  </p:childTnLst>
-                                </p:cTn>
-                              </p:par>
-                              <p:par>
-                                <p:cTn id="13" presetID="3" presetClass="emph" presetSubtype="2" fill="hold" nodeType="withEffect">
-                                  <p:stCondLst>
-                                    <p:cond delay="0"/>
-                                  </p:stCondLst>
-                                  <p:childTnLst>
-                                    <p:animClr clrSpc="rgb" dir="cw">
-                                      <p:cBhvr override="childStyle">
-                                        <p:cTn id="14" dur="2000" fill="hold"/>
-                                        <p:tgtEl>
-                                          <p:spTgt spid="2">
-                                            <p:txEl>
-                                              <p:pRg st="5" end="5"/>
-                                            </p:txEl>
-                                          </p:spTgt>
-                                        </p:tgtEl>
-                                        <p:attrNameLst>
-                                          <p:attrName>style.color</p:attrName>
-                                        </p:attrNameLst>
-                                      </p:cBhvr>
-                                      <p:to>
-                                        <a:schemeClr val="bg2"/>
-                                      </p:to>
-                                    </p:animClr>
-                                  </p:childTnLst>
-                                </p:cTn>
-                              </p:par>
-                              <p:par>
-                                <p:cTn id="15" presetID="3" presetClass="emph" presetSubtype="2" fill="hold" nodeType="withEffect">
-                                  <p:stCondLst>
-                                    <p:cond delay="0"/>
-                                  </p:stCondLst>
-                                  <p:childTnLst>
-                                    <p:animClr clrSpc="rgb" dir="cw">
-                                      <p:cBhvr override="childStyle">
-                                        <p:cTn id="16" dur="2000" fill="hold"/>
-                                        <p:tgtEl>
-                                          <p:spTgt spid="2">
-                                            <p:txEl>
-                                              <p:pRg st="6" end="6"/>
-                                            </p:txEl>
-                                          </p:spTgt>
-                                        </p:tgtEl>
-                                        <p:attrNameLst>
-                                          <p:attrName>style.color</p:attrName>
-                                        </p:attrNameLst>
-                                      </p:cBhvr>
-                                      <p:to>
-                                        <a:schemeClr val="bg2"/>
-                                      </p:to>
-                                    </p:animClr>
-                                  </p:childTnLst>
-                                </p:cTn>
-                              </p:par>
-                              <p:par>
-                                <p:cTn id="17" presetID="6" presetClass="emph" presetSubtype="0" fill="hold" nodeType="withEffect">
-                                  <p:stCondLst>
-                                    <p:cond delay="0"/>
-                                  </p:stCondLst>
-                                  <p:childTnLst>
-                                    <p:animScale>
-                                      <p:cBhvr>
-                                        <p:cTn id="18" dur="2000" fill="hold"/>
-                                        <p:tgtEl>
-                                          <p:spTgt spid="2">
-                                            <p:txEl>
-                                              <p:pRg st="0" end="0"/>
-                                            </p:txEl>
-                                          </p:spTgt>
-                                        </p:tgtEl>
-                                      </p:cBhvr>
-                                      <p:by x="150000" y="150000"/>
-                                    </p:animScale>
-                                  </p:childTnLst>
-                                </p:cTn>
-                              </p:par>
-                            </p:childTnLst>
-                          </p:cTn>
-                        </p:par>
-                      </p:childTnLst>
-                    </p:cTn>
-                  </p:par>
-                </p:childTnLst>
-              </p:cTn>
-              <p:prevCondLst>
-                <p:cond evt="onPrev" delay="0">
-                  <p:tgtEl>
-                    <p:sldTgt/>
-                  </p:tgtEl>
-                </p:cond>
-              </p:prevCondLst>
-              <p:nextCondLst>
-                <p:cond evt="onNext" delay="0">
-                  <p:tgtEl>
-                    <p:sldTgt/>
-                  </p:tgtEl>
-                </p:cond>
-              </p:nextCondLst>
-            </p:seq>
-          </p:childTnLst>
-        </p:cTn>
-      </p:par>
-    </p:tnLst>
-  </p:timing>
 </p:sld>
 </file>
 
@@ -19369,1066 +19137,6 @@
       <p:transition spd="slow" advClick="0"/>
     </mc:Fallback>
   </mc:AlternateContent>
-  <p:timing>
-    <p:tnLst>
-      <p:par>
-        <p:cTn id="1" dur="indefinite" restart="never" nodeType="tmRoot">
-          <p:childTnLst>
-            <p:seq concurrent="1" nextAc="seek">
-              <p:cTn id="2" dur="indefinite" nodeType="mainSeq">
-                <p:childTnLst>
-                  <p:par>
-                    <p:cTn id="3" fill="hold">
-                      <p:stCondLst>
-                        <p:cond delay="indefinite"/>
-                      </p:stCondLst>
-                      <p:childTnLst>
-                        <p:par>
-                          <p:cTn id="4" fill="hold">
-                            <p:stCondLst>
-                              <p:cond delay="0"/>
-                            </p:stCondLst>
-                            <p:childTnLst>
-                              <p:par>
-                                <p:cTn id="5" presetID="2" presetClass="entr" presetSubtype="2" fill="hold" nodeType="clickEffect">
-                                  <p:stCondLst>
-                                    <p:cond delay="0"/>
-                                  </p:stCondLst>
-                                  <p:childTnLst>
-                                    <p:set>
-                                      <p:cBhvr>
-                                        <p:cTn id="6" dur="1" fill="hold">
-                                          <p:stCondLst>
-                                            <p:cond delay="0"/>
-                                          </p:stCondLst>
-                                        </p:cTn>
-                                        <p:tgtEl>
-                                          <p:spTgt spid="2">
-                                            <p:txEl>
-                                              <p:pRg st="0" end="0"/>
-                                            </p:txEl>
-                                          </p:spTgt>
-                                        </p:tgtEl>
-                                        <p:attrNameLst>
-                                          <p:attrName>style.visibility</p:attrName>
-                                        </p:attrNameLst>
-                                      </p:cBhvr>
-                                      <p:to>
-                                        <p:strVal val="visible"/>
-                                      </p:to>
-                                    </p:set>
-                                    <p:anim calcmode="lin" valueType="num">
-                                      <p:cBhvr additive="base">
-                                        <p:cTn id="7" dur="500" fill="hold"/>
-                                        <p:tgtEl>
-                                          <p:spTgt spid="2">
-                                            <p:txEl>
-                                              <p:pRg st="0" end="0"/>
-                                            </p:txEl>
-                                          </p:spTgt>
-                                        </p:tgtEl>
-                                        <p:attrNameLst>
-                                          <p:attrName>ppt_x</p:attrName>
-                                        </p:attrNameLst>
-                                      </p:cBhvr>
-                                      <p:tavLst>
-                                        <p:tav tm="0">
-                                          <p:val>
-                                            <p:strVal val="1+#ppt_w/2"/>
-                                          </p:val>
-                                        </p:tav>
-                                        <p:tav tm="100000">
-                                          <p:val>
-                                            <p:strVal val="#ppt_x"/>
-                                          </p:val>
-                                        </p:tav>
-                                      </p:tavLst>
-                                    </p:anim>
-                                    <p:anim calcmode="lin" valueType="num">
-                                      <p:cBhvr additive="base">
-                                        <p:cTn id="8" dur="500" fill="hold"/>
-                                        <p:tgtEl>
-                                          <p:spTgt spid="2">
-                                            <p:txEl>
-                                              <p:pRg st="0" end="0"/>
-                                            </p:txEl>
-                                          </p:spTgt>
-                                        </p:tgtEl>
-                                        <p:attrNameLst>
-                                          <p:attrName>ppt_y</p:attrName>
-                                        </p:attrNameLst>
-                                      </p:cBhvr>
-                                      <p:tavLst>
-                                        <p:tav tm="0">
-                                          <p:val>
-                                            <p:strVal val="#ppt_y"/>
-                                          </p:val>
-                                        </p:tav>
-                                        <p:tav tm="100000">
-                                          <p:val>
-                                            <p:strVal val="#ppt_y"/>
-                                          </p:val>
-                                        </p:tav>
-                                      </p:tavLst>
-                                    </p:anim>
-                                  </p:childTnLst>
-                                </p:cTn>
-                              </p:par>
-                            </p:childTnLst>
-                          </p:cTn>
-                        </p:par>
-                      </p:childTnLst>
-                    </p:cTn>
-                  </p:par>
-                  <p:par>
-                    <p:cTn id="9" fill="hold">
-                      <p:stCondLst>
-                        <p:cond delay="indefinite"/>
-                      </p:stCondLst>
-                      <p:childTnLst>
-                        <p:par>
-                          <p:cTn id="10" fill="hold">
-                            <p:stCondLst>
-                              <p:cond delay="0"/>
-                            </p:stCondLst>
-                            <p:childTnLst>
-                              <p:par>
-                                <p:cTn id="11" presetID="2" presetClass="entr" presetSubtype="2" fill="hold" nodeType="clickEffect">
-                                  <p:stCondLst>
-                                    <p:cond delay="0"/>
-                                  </p:stCondLst>
-                                  <p:childTnLst>
-                                    <p:set>
-                                      <p:cBhvr>
-                                        <p:cTn id="12" dur="1" fill="hold">
-                                          <p:stCondLst>
-                                            <p:cond delay="0"/>
-                                          </p:stCondLst>
-                                        </p:cTn>
-                                        <p:tgtEl>
-                                          <p:spTgt spid="2">
-                                            <p:txEl>
-                                              <p:pRg st="1" end="1"/>
-                                            </p:txEl>
-                                          </p:spTgt>
-                                        </p:tgtEl>
-                                        <p:attrNameLst>
-                                          <p:attrName>style.visibility</p:attrName>
-                                        </p:attrNameLst>
-                                      </p:cBhvr>
-                                      <p:to>
-                                        <p:strVal val="visible"/>
-                                      </p:to>
-                                    </p:set>
-                                    <p:anim calcmode="lin" valueType="num">
-                                      <p:cBhvr additive="base">
-                                        <p:cTn id="13" dur="500" fill="hold"/>
-                                        <p:tgtEl>
-                                          <p:spTgt spid="2">
-                                            <p:txEl>
-                                              <p:pRg st="1" end="1"/>
-                                            </p:txEl>
-                                          </p:spTgt>
-                                        </p:tgtEl>
-                                        <p:attrNameLst>
-                                          <p:attrName>ppt_x</p:attrName>
-                                        </p:attrNameLst>
-                                      </p:cBhvr>
-                                      <p:tavLst>
-                                        <p:tav tm="0">
-                                          <p:val>
-                                            <p:strVal val="1+#ppt_w/2"/>
-                                          </p:val>
-                                        </p:tav>
-                                        <p:tav tm="100000">
-                                          <p:val>
-                                            <p:strVal val="#ppt_x"/>
-                                          </p:val>
-                                        </p:tav>
-                                      </p:tavLst>
-                                    </p:anim>
-                                    <p:anim calcmode="lin" valueType="num">
-                                      <p:cBhvr additive="base">
-                                        <p:cTn id="14" dur="500" fill="hold"/>
-                                        <p:tgtEl>
-                                          <p:spTgt spid="2">
-                                            <p:txEl>
-                                              <p:pRg st="1" end="1"/>
-                                            </p:txEl>
-                                          </p:spTgt>
-                                        </p:tgtEl>
-                                        <p:attrNameLst>
-                                          <p:attrName>ppt_y</p:attrName>
-                                        </p:attrNameLst>
-                                      </p:cBhvr>
-                                      <p:tavLst>
-                                        <p:tav tm="0">
-                                          <p:val>
-                                            <p:strVal val="#ppt_y"/>
-                                          </p:val>
-                                        </p:tav>
-                                        <p:tav tm="100000">
-                                          <p:val>
-                                            <p:strVal val="#ppt_y"/>
-                                          </p:val>
-                                        </p:tav>
-                                      </p:tavLst>
-                                    </p:anim>
-                                  </p:childTnLst>
-                                </p:cTn>
-                              </p:par>
-                            </p:childTnLst>
-                          </p:cTn>
-                        </p:par>
-                      </p:childTnLst>
-                    </p:cTn>
-                  </p:par>
-                  <p:par>
-                    <p:cTn id="15" fill="hold">
-                      <p:stCondLst>
-                        <p:cond delay="indefinite"/>
-                      </p:stCondLst>
-                      <p:childTnLst>
-                        <p:par>
-                          <p:cTn id="16" fill="hold">
-                            <p:stCondLst>
-                              <p:cond delay="0"/>
-                            </p:stCondLst>
-                            <p:childTnLst>
-                              <p:par>
-                                <p:cTn id="17" presetID="2" presetClass="entr" presetSubtype="2" fill="hold" nodeType="clickEffect">
-                                  <p:stCondLst>
-                                    <p:cond delay="0"/>
-                                  </p:stCondLst>
-                                  <p:childTnLst>
-                                    <p:set>
-                                      <p:cBhvr>
-                                        <p:cTn id="18" dur="1" fill="hold">
-                                          <p:stCondLst>
-                                            <p:cond delay="0"/>
-                                          </p:stCondLst>
-                                        </p:cTn>
-                                        <p:tgtEl>
-                                          <p:spTgt spid="2">
-                                            <p:txEl>
-                                              <p:pRg st="2" end="2"/>
-                                            </p:txEl>
-                                          </p:spTgt>
-                                        </p:tgtEl>
-                                        <p:attrNameLst>
-                                          <p:attrName>style.visibility</p:attrName>
-                                        </p:attrNameLst>
-                                      </p:cBhvr>
-                                      <p:to>
-                                        <p:strVal val="visible"/>
-                                      </p:to>
-                                    </p:set>
-                                    <p:anim calcmode="lin" valueType="num">
-                                      <p:cBhvr additive="base">
-                                        <p:cTn id="19" dur="500" fill="hold"/>
-                                        <p:tgtEl>
-                                          <p:spTgt spid="2">
-                                            <p:txEl>
-                                              <p:pRg st="2" end="2"/>
-                                            </p:txEl>
-                                          </p:spTgt>
-                                        </p:tgtEl>
-                                        <p:attrNameLst>
-                                          <p:attrName>ppt_x</p:attrName>
-                                        </p:attrNameLst>
-                                      </p:cBhvr>
-                                      <p:tavLst>
-                                        <p:tav tm="0">
-                                          <p:val>
-                                            <p:strVal val="1+#ppt_w/2"/>
-                                          </p:val>
-                                        </p:tav>
-                                        <p:tav tm="100000">
-                                          <p:val>
-                                            <p:strVal val="#ppt_x"/>
-                                          </p:val>
-                                        </p:tav>
-                                      </p:tavLst>
-                                    </p:anim>
-                                    <p:anim calcmode="lin" valueType="num">
-                                      <p:cBhvr additive="base">
-                                        <p:cTn id="20" dur="500" fill="hold"/>
-                                        <p:tgtEl>
-                                          <p:spTgt spid="2">
-                                            <p:txEl>
-                                              <p:pRg st="2" end="2"/>
-                                            </p:txEl>
-                                          </p:spTgt>
-                                        </p:tgtEl>
-                                        <p:attrNameLst>
-                                          <p:attrName>ppt_y</p:attrName>
-                                        </p:attrNameLst>
-                                      </p:cBhvr>
-                                      <p:tavLst>
-                                        <p:tav tm="0">
-                                          <p:val>
-                                            <p:strVal val="#ppt_y"/>
-                                          </p:val>
-                                        </p:tav>
-                                        <p:tav tm="100000">
-                                          <p:val>
-                                            <p:strVal val="#ppt_y"/>
-                                          </p:val>
-                                        </p:tav>
-                                      </p:tavLst>
-                                    </p:anim>
-                                  </p:childTnLst>
-                                </p:cTn>
-                              </p:par>
-                            </p:childTnLst>
-                          </p:cTn>
-                        </p:par>
-                      </p:childTnLst>
-                    </p:cTn>
-                  </p:par>
-                  <p:par>
-                    <p:cTn id="21" fill="hold">
-                      <p:stCondLst>
-                        <p:cond delay="indefinite"/>
-                      </p:stCondLst>
-                      <p:childTnLst>
-                        <p:par>
-                          <p:cTn id="22" fill="hold">
-                            <p:stCondLst>
-                              <p:cond delay="0"/>
-                            </p:stCondLst>
-                            <p:childTnLst>
-                              <p:par>
-                                <p:cTn id="23" presetID="2" presetClass="entr" presetSubtype="2" fill="hold" nodeType="clickEffect">
-                                  <p:stCondLst>
-                                    <p:cond delay="0"/>
-                                  </p:stCondLst>
-                                  <p:childTnLst>
-                                    <p:set>
-                                      <p:cBhvr>
-                                        <p:cTn id="24" dur="1" fill="hold">
-                                          <p:stCondLst>
-                                            <p:cond delay="0"/>
-                                          </p:stCondLst>
-                                        </p:cTn>
-                                        <p:tgtEl>
-                                          <p:spTgt spid="2">
-                                            <p:txEl>
-                                              <p:pRg st="3" end="3"/>
-                                            </p:txEl>
-                                          </p:spTgt>
-                                        </p:tgtEl>
-                                        <p:attrNameLst>
-                                          <p:attrName>style.visibility</p:attrName>
-                                        </p:attrNameLst>
-                                      </p:cBhvr>
-                                      <p:to>
-                                        <p:strVal val="visible"/>
-                                      </p:to>
-                                    </p:set>
-                                    <p:anim calcmode="lin" valueType="num">
-                                      <p:cBhvr additive="base">
-                                        <p:cTn id="25" dur="500" fill="hold"/>
-                                        <p:tgtEl>
-                                          <p:spTgt spid="2">
-                                            <p:txEl>
-                                              <p:pRg st="3" end="3"/>
-                                            </p:txEl>
-                                          </p:spTgt>
-                                        </p:tgtEl>
-                                        <p:attrNameLst>
-                                          <p:attrName>ppt_x</p:attrName>
-                                        </p:attrNameLst>
-                                      </p:cBhvr>
-                                      <p:tavLst>
-                                        <p:tav tm="0">
-                                          <p:val>
-                                            <p:strVal val="1+#ppt_w/2"/>
-                                          </p:val>
-                                        </p:tav>
-                                        <p:tav tm="100000">
-                                          <p:val>
-                                            <p:strVal val="#ppt_x"/>
-                                          </p:val>
-                                        </p:tav>
-                                      </p:tavLst>
-                                    </p:anim>
-                                    <p:anim calcmode="lin" valueType="num">
-                                      <p:cBhvr additive="base">
-                                        <p:cTn id="26" dur="500" fill="hold"/>
-                                        <p:tgtEl>
-                                          <p:spTgt spid="2">
-                                            <p:txEl>
-                                              <p:pRg st="3" end="3"/>
-                                            </p:txEl>
-                                          </p:spTgt>
-                                        </p:tgtEl>
-                                        <p:attrNameLst>
-                                          <p:attrName>ppt_y</p:attrName>
-                                        </p:attrNameLst>
-                                      </p:cBhvr>
-                                      <p:tavLst>
-                                        <p:tav tm="0">
-                                          <p:val>
-                                            <p:strVal val="#ppt_y"/>
-                                          </p:val>
-                                        </p:tav>
-                                        <p:tav tm="100000">
-                                          <p:val>
-                                            <p:strVal val="#ppt_y"/>
-                                          </p:val>
-                                        </p:tav>
-                                      </p:tavLst>
-                                    </p:anim>
-                                  </p:childTnLst>
-                                </p:cTn>
-                              </p:par>
-                            </p:childTnLst>
-                          </p:cTn>
-                        </p:par>
-                      </p:childTnLst>
-                    </p:cTn>
-                  </p:par>
-                  <p:par>
-                    <p:cTn id="27" fill="hold">
-                      <p:stCondLst>
-                        <p:cond delay="indefinite"/>
-                      </p:stCondLst>
-                      <p:childTnLst>
-                        <p:par>
-                          <p:cTn id="28" fill="hold">
-                            <p:stCondLst>
-                              <p:cond delay="0"/>
-                            </p:stCondLst>
-                            <p:childTnLst>
-                              <p:par>
-                                <p:cTn id="29" presetID="2" presetClass="entr" presetSubtype="2" fill="hold" nodeType="clickEffect">
-                                  <p:stCondLst>
-                                    <p:cond delay="0"/>
-                                  </p:stCondLst>
-                                  <p:childTnLst>
-                                    <p:set>
-                                      <p:cBhvr>
-                                        <p:cTn id="30" dur="1" fill="hold">
-                                          <p:stCondLst>
-                                            <p:cond delay="0"/>
-                                          </p:stCondLst>
-                                        </p:cTn>
-                                        <p:tgtEl>
-                                          <p:spTgt spid="2">
-                                            <p:txEl>
-                                              <p:pRg st="4" end="4"/>
-                                            </p:txEl>
-                                          </p:spTgt>
-                                        </p:tgtEl>
-                                        <p:attrNameLst>
-                                          <p:attrName>style.visibility</p:attrName>
-                                        </p:attrNameLst>
-                                      </p:cBhvr>
-                                      <p:to>
-                                        <p:strVal val="visible"/>
-                                      </p:to>
-                                    </p:set>
-                                    <p:anim calcmode="lin" valueType="num">
-                                      <p:cBhvr additive="base">
-                                        <p:cTn id="31" dur="500" fill="hold"/>
-                                        <p:tgtEl>
-                                          <p:spTgt spid="2">
-                                            <p:txEl>
-                                              <p:pRg st="4" end="4"/>
-                                            </p:txEl>
-                                          </p:spTgt>
-                                        </p:tgtEl>
-                                        <p:attrNameLst>
-                                          <p:attrName>ppt_x</p:attrName>
-                                        </p:attrNameLst>
-                                      </p:cBhvr>
-                                      <p:tavLst>
-                                        <p:tav tm="0">
-                                          <p:val>
-                                            <p:strVal val="1+#ppt_w/2"/>
-                                          </p:val>
-                                        </p:tav>
-                                        <p:tav tm="100000">
-                                          <p:val>
-                                            <p:strVal val="#ppt_x"/>
-                                          </p:val>
-                                        </p:tav>
-                                      </p:tavLst>
-                                    </p:anim>
-                                    <p:anim calcmode="lin" valueType="num">
-                                      <p:cBhvr additive="base">
-                                        <p:cTn id="32" dur="500" fill="hold"/>
-                                        <p:tgtEl>
-                                          <p:spTgt spid="2">
-                                            <p:txEl>
-                                              <p:pRg st="4" end="4"/>
-                                            </p:txEl>
-                                          </p:spTgt>
-                                        </p:tgtEl>
-                                        <p:attrNameLst>
-                                          <p:attrName>ppt_y</p:attrName>
-                                        </p:attrNameLst>
-                                      </p:cBhvr>
-                                      <p:tavLst>
-                                        <p:tav tm="0">
-                                          <p:val>
-                                            <p:strVal val="#ppt_y"/>
-                                          </p:val>
-                                        </p:tav>
-                                        <p:tav tm="100000">
-                                          <p:val>
-                                            <p:strVal val="#ppt_y"/>
-                                          </p:val>
-                                        </p:tav>
-                                      </p:tavLst>
-                                    </p:anim>
-                                  </p:childTnLst>
-                                </p:cTn>
-                              </p:par>
-                            </p:childTnLst>
-                          </p:cTn>
-                        </p:par>
-                      </p:childTnLst>
-                    </p:cTn>
-                  </p:par>
-                  <p:par>
-                    <p:cTn id="33" fill="hold">
-                      <p:stCondLst>
-                        <p:cond delay="indefinite"/>
-                      </p:stCondLst>
-                      <p:childTnLst>
-                        <p:par>
-                          <p:cTn id="34" fill="hold">
-                            <p:stCondLst>
-                              <p:cond delay="0"/>
-                            </p:stCondLst>
-                            <p:childTnLst>
-                              <p:par>
-                                <p:cTn id="35" presetID="2" presetClass="entr" presetSubtype="2" fill="hold" nodeType="clickEffect">
-                                  <p:stCondLst>
-                                    <p:cond delay="0"/>
-                                  </p:stCondLst>
-                                  <p:childTnLst>
-                                    <p:set>
-                                      <p:cBhvr>
-                                        <p:cTn id="36" dur="1" fill="hold">
-                                          <p:stCondLst>
-                                            <p:cond delay="0"/>
-                                          </p:stCondLst>
-                                        </p:cTn>
-                                        <p:tgtEl>
-                                          <p:spTgt spid="2">
-                                            <p:txEl>
-                                              <p:pRg st="5" end="5"/>
-                                            </p:txEl>
-                                          </p:spTgt>
-                                        </p:tgtEl>
-                                        <p:attrNameLst>
-                                          <p:attrName>style.visibility</p:attrName>
-                                        </p:attrNameLst>
-                                      </p:cBhvr>
-                                      <p:to>
-                                        <p:strVal val="visible"/>
-                                      </p:to>
-                                    </p:set>
-                                    <p:anim calcmode="lin" valueType="num">
-                                      <p:cBhvr additive="base">
-                                        <p:cTn id="37" dur="500" fill="hold"/>
-                                        <p:tgtEl>
-                                          <p:spTgt spid="2">
-                                            <p:txEl>
-                                              <p:pRg st="5" end="5"/>
-                                            </p:txEl>
-                                          </p:spTgt>
-                                        </p:tgtEl>
-                                        <p:attrNameLst>
-                                          <p:attrName>ppt_x</p:attrName>
-                                        </p:attrNameLst>
-                                      </p:cBhvr>
-                                      <p:tavLst>
-                                        <p:tav tm="0">
-                                          <p:val>
-                                            <p:strVal val="1+#ppt_w/2"/>
-                                          </p:val>
-                                        </p:tav>
-                                        <p:tav tm="100000">
-                                          <p:val>
-                                            <p:strVal val="#ppt_x"/>
-                                          </p:val>
-                                        </p:tav>
-                                      </p:tavLst>
-                                    </p:anim>
-                                    <p:anim calcmode="lin" valueType="num">
-                                      <p:cBhvr additive="base">
-                                        <p:cTn id="38" dur="500" fill="hold"/>
-                                        <p:tgtEl>
-                                          <p:spTgt spid="2">
-                                            <p:txEl>
-                                              <p:pRg st="5" end="5"/>
-                                            </p:txEl>
-                                          </p:spTgt>
-                                        </p:tgtEl>
-                                        <p:attrNameLst>
-                                          <p:attrName>ppt_y</p:attrName>
-                                        </p:attrNameLst>
-                                      </p:cBhvr>
-                                      <p:tavLst>
-                                        <p:tav tm="0">
-                                          <p:val>
-                                            <p:strVal val="#ppt_y"/>
-                                          </p:val>
-                                        </p:tav>
-                                        <p:tav tm="100000">
-                                          <p:val>
-                                            <p:strVal val="#ppt_y"/>
-                                          </p:val>
-                                        </p:tav>
-                                      </p:tavLst>
-                                    </p:anim>
-                                  </p:childTnLst>
-                                </p:cTn>
-                              </p:par>
-                            </p:childTnLst>
-                          </p:cTn>
-                        </p:par>
-                      </p:childTnLst>
-                    </p:cTn>
-                  </p:par>
-                  <p:par>
-                    <p:cTn id="39" fill="hold">
-                      <p:stCondLst>
-                        <p:cond delay="indefinite"/>
-                      </p:stCondLst>
-                      <p:childTnLst>
-                        <p:par>
-                          <p:cTn id="40" fill="hold">
-                            <p:stCondLst>
-                              <p:cond delay="0"/>
-                            </p:stCondLst>
-                            <p:childTnLst>
-                              <p:par>
-                                <p:cTn id="41" presetID="2" presetClass="entr" presetSubtype="2" fill="hold" nodeType="clickEffect">
-                                  <p:stCondLst>
-                                    <p:cond delay="0"/>
-                                  </p:stCondLst>
-                                  <p:childTnLst>
-                                    <p:set>
-                                      <p:cBhvr>
-                                        <p:cTn id="42" dur="1" fill="hold">
-                                          <p:stCondLst>
-                                            <p:cond delay="0"/>
-                                          </p:stCondLst>
-                                        </p:cTn>
-                                        <p:tgtEl>
-                                          <p:spTgt spid="2">
-                                            <p:txEl>
-                                              <p:pRg st="6" end="6"/>
-                                            </p:txEl>
-                                          </p:spTgt>
-                                        </p:tgtEl>
-                                        <p:attrNameLst>
-                                          <p:attrName>style.visibility</p:attrName>
-                                        </p:attrNameLst>
-                                      </p:cBhvr>
-                                      <p:to>
-                                        <p:strVal val="visible"/>
-                                      </p:to>
-                                    </p:set>
-                                    <p:anim calcmode="lin" valueType="num">
-                                      <p:cBhvr additive="base">
-                                        <p:cTn id="43" dur="500" fill="hold"/>
-                                        <p:tgtEl>
-                                          <p:spTgt spid="2">
-                                            <p:txEl>
-                                              <p:pRg st="6" end="6"/>
-                                            </p:txEl>
-                                          </p:spTgt>
-                                        </p:tgtEl>
-                                        <p:attrNameLst>
-                                          <p:attrName>ppt_x</p:attrName>
-                                        </p:attrNameLst>
-                                      </p:cBhvr>
-                                      <p:tavLst>
-                                        <p:tav tm="0">
-                                          <p:val>
-                                            <p:strVal val="1+#ppt_w/2"/>
-                                          </p:val>
-                                        </p:tav>
-                                        <p:tav tm="100000">
-                                          <p:val>
-                                            <p:strVal val="#ppt_x"/>
-                                          </p:val>
-                                        </p:tav>
-                                      </p:tavLst>
-                                    </p:anim>
-                                    <p:anim calcmode="lin" valueType="num">
-                                      <p:cBhvr additive="base">
-                                        <p:cTn id="44" dur="500" fill="hold"/>
-                                        <p:tgtEl>
-                                          <p:spTgt spid="2">
-                                            <p:txEl>
-                                              <p:pRg st="6" end="6"/>
-                                            </p:txEl>
-                                          </p:spTgt>
-                                        </p:tgtEl>
-                                        <p:attrNameLst>
-                                          <p:attrName>ppt_y</p:attrName>
-                                        </p:attrNameLst>
-                                      </p:cBhvr>
-                                      <p:tavLst>
-                                        <p:tav tm="0">
-                                          <p:val>
-                                            <p:strVal val="#ppt_y"/>
-                                          </p:val>
-                                        </p:tav>
-                                        <p:tav tm="100000">
-                                          <p:val>
-                                            <p:strVal val="#ppt_y"/>
-                                          </p:val>
-                                        </p:tav>
-                                      </p:tavLst>
-                                    </p:anim>
-                                  </p:childTnLst>
-                                </p:cTn>
-                              </p:par>
-                            </p:childTnLst>
-                          </p:cTn>
-                        </p:par>
-                      </p:childTnLst>
-                    </p:cTn>
-                  </p:par>
-                  <p:par>
-                    <p:cTn id="45" fill="hold">
-                      <p:stCondLst>
-                        <p:cond delay="indefinite"/>
-                      </p:stCondLst>
-                      <p:childTnLst>
-                        <p:par>
-                          <p:cTn id="46" fill="hold">
-                            <p:stCondLst>
-                              <p:cond delay="0"/>
-                            </p:stCondLst>
-                            <p:childTnLst>
-                              <p:par>
-                                <p:cTn id="47" presetID="2" presetClass="entr" presetSubtype="2" fill="hold" nodeType="clickEffect">
-                                  <p:stCondLst>
-                                    <p:cond delay="0"/>
-                                  </p:stCondLst>
-                                  <p:childTnLst>
-                                    <p:set>
-                                      <p:cBhvr>
-                                        <p:cTn id="48" dur="1" fill="hold">
-                                          <p:stCondLst>
-                                            <p:cond delay="0"/>
-                                          </p:stCondLst>
-                                        </p:cTn>
-                                        <p:tgtEl>
-                                          <p:spTgt spid="2">
-                                            <p:txEl>
-                                              <p:pRg st="7" end="7"/>
-                                            </p:txEl>
-                                          </p:spTgt>
-                                        </p:tgtEl>
-                                        <p:attrNameLst>
-                                          <p:attrName>style.visibility</p:attrName>
-                                        </p:attrNameLst>
-                                      </p:cBhvr>
-                                      <p:to>
-                                        <p:strVal val="visible"/>
-                                      </p:to>
-                                    </p:set>
-                                    <p:anim calcmode="lin" valueType="num">
-                                      <p:cBhvr additive="base">
-                                        <p:cTn id="49" dur="500" fill="hold"/>
-                                        <p:tgtEl>
-                                          <p:spTgt spid="2">
-                                            <p:txEl>
-                                              <p:pRg st="7" end="7"/>
-                                            </p:txEl>
-                                          </p:spTgt>
-                                        </p:tgtEl>
-                                        <p:attrNameLst>
-                                          <p:attrName>ppt_x</p:attrName>
-                                        </p:attrNameLst>
-                                      </p:cBhvr>
-                                      <p:tavLst>
-                                        <p:tav tm="0">
-                                          <p:val>
-                                            <p:strVal val="1+#ppt_w/2"/>
-                                          </p:val>
-                                        </p:tav>
-                                        <p:tav tm="100000">
-                                          <p:val>
-                                            <p:strVal val="#ppt_x"/>
-                                          </p:val>
-                                        </p:tav>
-                                      </p:tavLst>
-                                    </p:anim>
-                                    <p:anim calcmode="lin" valueType="num">
-                                      <p:cBhvr additive="base">
-                                        <p:cTn id="50" dur="500" fill="hold"/>
-                                        <p:tgtEl>
-                                          <p:spTgt spid="2">
-                                            <p:txEl>
-                                              <p:pRg st="7" end="7"/>
-                                            </p:txEl>
-                                          </p:spTgt>
-                                        </p:tgtEl>
-                                        <p:attrNameLst>
-                                          <p:attrName>ppt_y</p:attrName>
-                                        </p:attrNameLst>
-                                      </p:cBhvr>
-                                      <p:tavLst>
-                                        <p:tav tm="0">
-                                          <p:val>
-                                            <p:strVal val="#ppt_y"/>
-                                          </p:val>
-                                        </p:tav>
-                                        <p:tav tm="100000">
-                                          <p:val>
-                                            <p:strVal val="#ppt_y"/>
-                                          </p:val>
-                                        </p:tav>
-                                      </p:tavLst>
-                                    </p:anim>
-                                  </p:childTnLst>
-                                </p:cTn>
-                              </p:par>
-                            </p:childTnLst>
-                          </p:cTn>
-                        </p:par>
-                      </p:childTnLst>
-                    </p:cTn>
-                  </p:par>
-                  <p:par>
-                    <p:cTn id="51" fill="hold">
-                      <p:stCondLst>
-                        <p:cond delay="indefinite"/>
-                      </p:stCondLst>
-                      <p:childTnLst>
-                        <p:par>
-                          <p:cTn id="52" fill="hold">
-                            <p:stCondLst>
-                              <p:cond delay="0"/>
-                            </p:stCondLst>
-                            <p:childTnLst>
-                              <p:par>
-                                <p:cTn id="53" presetID="2" presetClass="entr" presetSubtype="2" fill="hold" nodeType="clickEffect">
-                                  <p:stCondLst>
-                                    <p:cond delay="0"/>
-                                  </p:stCondLst>
-                                  <p:childTnLst>
-                                    <p:set>
-                                      <p:cBhvr>
-                                        <p:cTn id="54" dur="1" fill="hold">
-                                          <p:stCondLst>
-                                            <p:cond delay="0"/>
-                                          </p:stCondLst>
-                                        </p:cTn>
-                                        <p:tgtEl>
-                                          <p:spTgt spid="2">
-                                            <p:txEl>
-                                              <p:pRg st="8" end="8"/>
-                                            </p:txEl>
-                                          </p:spTgt>
-                                        </p:tgtEl>
-                                        <p:attrNameLst>
-                                          <p:attrName>style.visibility</p:attrName>
-                                        </p:attrNameLst>
-                                      </p:cBhvr>
-                                      <p:to>
-                                        <p:strVal val="visible"/>
-                                      </p:to>
-                                    </p:set>
-                                    <p:anim calcmode="lin" valueType="num">
-                                      <p:cBhvr additive="base">
-                                        <p:cTn id="55" dur="500" fill="hold"/>
-                                        <p:tgtEl>
-                                          <p:spTgt spid="2">
-                                            <p:txEl>
-                                              <p:pRg st="8" end="8"/>
-                                            </p:txEl>
-                                          </p:spTgt>
-                                        </p:tgtEl>
-                                        <p:attrNameLst>
-                                          <p:attrName>ppt_x</p:attrName>
-                                        </p:attrNameLst>
-                                      </p:cBhvr>
-                                      <p:tavLst>
-                                        <p:tav tm="0">
-                                          <p:val>
-                                            <p:strVal val="1+#ppt_w/2"/>
-                                          </p:val>
-                                        </p:tav>
-                                        <p:tav tm="100000">
-                                          <p:val>
-                                            <p:strVal val="#ppt_x"/>
-                                          </p:val>
-                                        </p:tav>
-                                      </p:tavLst>
-                                    </p:anim>
-                                    <p:anim calcmode="lin" valueType="num">
-                                      <p:cBhvr additive="base">
-                                        <p:cTn id="56" dur="500" fill="hold"/>
-                                        <p:tgtEl>
-                                          <p:spTgt spid="2">
-                                            <p:txEl>
-                                              <p:pRg st="8" end="8"/>
-                                            </p:txEl>
-                                          </p:spTgt>
-                                        </p:tgtEl>
-                                        <p:attrNameLst>
-                                          <p:attrName>ppt_y</p:attrName>
-                                        </p:attrNameLst>
-                                      </p:cBhvr>
-                                      <p:tavLst>
-                                        <p:tav tm="0">
-                                          <p:val>
-                                            <p:strVal val="#ppt_y"/>
-                                          </p:val>
-                                        </p:tav>
-                                        <p:tav tm="100000">
-                                          <p:val>
-                                            <p:strVal val="#ppt_y"/>
-                                          </p:val>
-                                        </p:tav>
-                                      </p:tavLst>
-                                    </p:anim>
-                                  </p:childTnLst>
-                                </p:cTn>
-                              </p:par>
-                            </p:childTnLst>
-                          </p:cTn>
-                        </p:par>
-                      </p:childTnLst>
-                    </p:cTn>
-                  </p:par>
-                  <p:par>
-                    <p:cTn id="57" fill="hold">
-                      <p:stCondLst>
-                        <p:cond delay="indefinite"/>
-                      </p:stCondLst>
-                      <p:childTnLst>
-                        <p:par>
-                          <p:cTn id="58" fill="hold">
-                            <p:stCondLst>
-                              <p:cond delay="0"/>
-                            </p:stCondLst>
-                            <p:childTnLst>
-                              <p:par>
-                                <p:cTn id="59" presetID="2" presetClass="entr" presetSubtype="2" fill="hold" nodeType="clickEffect">
-                                  <p:stCondLst>
-                                    <p:cond delay="0"/>
-                                  </p:stCondLst>
-                                  <p:childTnLst>
-                                    <p:set>
-                                      <p:cBhvr>
-                                        <p:cTn id="60" dur="1" fill="hold">
-                                          <p:stCondLst>
-                                            <p:cond delay="0"/>
-                                          </p:stCondLst>
-                                        </p:cTn>
-                                        <p:tgtEl>
-                                          <p:spTgt spid="2">
-                                            <p:txEl>
-                                              <p:pRg st="9" end="9"/>
-                                            </p:txEl>
-                                          </p:spTgt>
-                                        </p:tgtEl>
-                                        <p:attrNameLst>
-                                          <p:attrName>style.visibility</p:attrName>
-                                        </p:attrNameLst>
-                                      </p:cBhvr>
-                                      <p:to>
-                                        <p:strVal val="visible"/>
-                                      </p:to>
-                                    </p:set>
-                                    <p:anim calcmode="lin" valueType="num">
-                                      <p:cBhvr additive="base">
-                                        <p:cTn id="61" dur="500" fill="hold"/>
-                                        <p:tgtEl>
-                                          <p:spTgt spid="2">
-                                            <p:txEl>
-                                              <p:pRg st="9" end="9"/>
-                                            </p:txEl>
-                                          </p:spTgt>
-                                        </p:tgtEl>
-                                        <p:attrNameLst>
-                                          <p:attrName>ppt_x</p:attrName>
-                                        </p:attrNameLst>
-                                      </p:cBhvr>
-                                      <p:tavLst>
-                                        <p:tav tm="0">
-                                          <p:val>
-                                            <p:strVal val="1+#ppt_w/2"/>
-                                          </p:val>
-                                        </p:tav>
-                                        <p:tav tm="100000">
-                                          <p:val>
-                                            <p:strVal val="#ppt_x"/>
-                                          </p:val>
-                                        </p:tav>
-                                      </p:tavLst>
-                                    </p:anim>
-                                    <p:anim calcmode="lin" valueType="num">
-                                      <p:cBhvr additive="base">
-                                        <p:cTn id="62" dur="500" fill="hold"/>
-                                        <p:tgtEl>
-                                          <p:spTgt spid="2">
-                                            <p:txEl>
-                                              <p:pRg st="9" end="9"/>
-                                            </p:txEl>
-                                          </p:spTgt>
-                                        </p:tgtEl>
-                                        <p:attrNameLst>
-                                          <p:attrName>ppt_y</p:attrName>
-                                        </p:attrNameLst>
-                                      </p:cBhvr>
-                                      <p:tavLst>
-                                        <p:tav tm="0">
-                                          <p:val>
-                                            <p:strVal val="#ppt_y"/>
-                                          </p:val>
-                                        </p:tav>
-                                        <p:tav tm="100000">
-                                          <p:val>
-                                            <p:strVal val="#ppt_y"/>
-                                          </p:val>
-                                        </p:tav>
-                                      </p:tavLst>
-                                    </p:anim>
-                                  </p:childTnLst>
-                                </p:cTn>
-                              </p:par>
-                            </p:childTnLst>
-                          </p:cTn>
-                        </p:par>
-                      </p:childTnLst>
-                    </p:cTn>
-                  </p:par>
-                </p:childTnLst>
-              </p:cTn>
-              <p:prevCondLst>
-                <p:cond evt="onPrev" delay="0">
-                  <p:tgtEl>
-                    <p:sldTgt/>
-                  </p:tgtEl>
-                </p:cond>
-              </p:prevCondLst>
-              <p:nextCondLst>
-                <p:cond evt="onNext" delay="0">
-                  <p:tgtEl>
-                    <p:sldTgt/>
-                  </p:tgtEl>
-                </p:cond>
-              </p:nextCondLst>
-            </p:seq>
-          </p:childTnLst>
-        </p:cTn>
-      </p:par>
-    </p:tnLst>
-  </p:timing>
 </p:sld>
 </file>
 
@@ -24880,12 +23588,6 @@
 </file>
 
 <file path=customXml/item1.xml><?xml version="1.0" encoding="utf-8"?>
-<p:properties xmlns:p="http://schemas.microsoft.com/office/2006/metadata/properties" xmlns:xsi="http://www.w3.org/2001/XMLSchema-instance" xmlns:pc="http://schemas.microsoft.com/office/infopath/2007/PartnerControls">
-  <documentManagement/>
-</p:properties>
-</file>
-
-<file path=customXml/item2.xml><?xml version="1.0" encoding="utf-8"?>
 <?mso-contentType ?>
 <FormTemplates xmlns="http://schemas.microsoft.com/sharepoint/v3/contenttype/forms">
   <Display>DocumentLibraryForm</Display>
@@ -24894,7 +23596,7 @@
 </FormTemplates>
 </file>
 
-<file path=customXml/item3.xml><?xml version="1.0" encoding="utf-8"?>
+<file path=customXml/item2.xml><?xml version="1.0" encoding="utf-8"?>
 <ct:contentTypeSchema xmlns:ct="http://schemas.microsoft.com/office/2006/metadata/contentType" xmlns:ma="http://schemas.microsoft.com/office/2006/metadata/properties/metaAttributes" ct:_="" ma:_="" ma:contentTypeName="Document" ma:contentTypeID="0x0101008F5D289A73ACA946A98E359C5D7D744A" ma:contentTypeVersion="0" ma:contentTypeDescription="Create a new document." ma:contentTypeScope="" ma:versionID="c0c87ff6efd44868173d4e25b5ff5afd">
   <xsd:schema xmlns:xsd="http://www.w3.org/2001/XMLSchema" xmlns:xs="http://www.w3.org/2001/XMLSchema" xmlns:p="http://schemas.microsoft.com/office/2006/metadata/properties" targetNamespace="http://schemas.microsoft.com/office/2006/metadata/properties" ma:root="true" ma:fieldsID="1b05d82d297216baf5b26c55225140df">
     <xsd:element name="properties">
@@ -25008,22 +23710,13 @@
 </ct:contentTypeSchema>
 </file>
 
-<file path=customXml/itemProps1.xml><?xml version="1.0" encoding="utf-8"?>
-<ds:datastoreItem xmlns:ds="http://schemas.openxmlformats.org/officeDocument/2006/customXml" ds:itemID="{B88B6B59-2BB3-4710-B1AF-9A7366B3AE9E}">
-  <ds:schemaRefs>
-    <ds:schemaRef ds:uri="http://purl.org/dc/terms/"/>
-    <ds:schemaRef ds:uri="http://schemas.openxmlformats.org/package/2006/metadata/core-properties"/>
-    <ds:schemaRef ds:uri="http://schemas.microsoft.com/office/2006/documentManagement/types"/>
-    <ds:schemaRef ds:uri="http://schemas.microsoft.com/office/infopath/2007/PartnerControls"/>
-    <ds:schemaRef ds:uri="http://purl.org/dc/elements/1.1/"/>
-    <ds:schemaRef ds:uri="http://schemas.microsoft.com/office/2006/metadata/properties"/>
-    <ds:schemaRef ds:uri="http://www.w3.org/XML/1998/namespace"/>
-    <ds:schemaRef ds:uri="http://purl.org/dc/dcmitype/"/>
-  </ds:schemaRefs>
-</ds:datastoreItem>
+<file path=customXml/item3.xml><?xml version="1.0" encoding="utf-8"?>
+<p:properties xmlns:p="http://schemas.microsoft.com/office/2006/metadata/properties" xmlns:xsi="http://www.w3.org/2001/XMLSchema-instance" xmlns:pc="http://schemas.microsoft.com/office/infopath/2007/PartnerControls">
+  <documentManagement/>
+</p:properties>
 </file>
 
-<file path=customXml/itemProps2.xml><?xml version="1.0" encoding="utf-8"?>
+<file path=customXml/itemProps1.xml><?xml version="1.0" encoding="utf-8"?>
 <ds:datastoreItem xmlns:ds="http://schemas.openxmlformats.org/officeDocument/2006/customXml" ds:itemID="{40C6F769-85BB-44F9-B6C5-98E9026C84A2}">
   <ds:schemaRefs>
     <ds:schemaRef ds:uri="http://schemas.microsoft.com/sharepoint/v3/contenttype/forms"/>
@@ -25031,7 +23724,7 @@
 </ds:datastoreItem>
 </file>
 
-<file path=customXml/itemProps3.xml><?xml version="1.0" encoding="utf-8"?>
+<file path=customXml/itemProps2.xml><?xml version="1.0" encoding="utf-8"?>
 <ds:datastoreItem xmlns:ds="http://schemas.openxmlformats.org/officeDocument/2006/customXml" ds:itemID="{68A3732E-BBCB-48F9-A27F-A62596C1832C}">
   <ds:schemaRefs>
     <ds:schemaRef ds:uri="http://schemas.microsoft.com/office/2006/metadata/contentType"/>
@@ -25045,4 +23738,19 @@
     <ds:schemaRef ds:uri="http://schemas.microsoft.com/office/infopath/2007/PartnerControls"/>
   </ds:schemaRefs>
 </ds:datastoreItem>
+</file>
+
+<file path=customXml/itemProps3.xml><?xml version="1.0" encoding="utf-8"?>
+<ds:datastoreItem xmlns:ds="http://schemas.openxmlformats.org/officeDocument/2006/customXml" ds:itemID="{B88B6B59-2BB3-4710-B1AF-9A7366B3AE9E}">
+  <ds:schemaRefs>
+    <ds:schemaRef ds:uri="http://purl.org/dc/terms/"/>
+    <ds:schemaRef ds:uri="http://schemas.openxmlformats.org/package/2006/metadata/core-properties"/>
+    <ds:schemaRef ds:uri="http://schemas.microsoft.com/office/2006/documentManagement/types"/>
+    <ds:schemaRef ds:uri="http://schemas.microsoft.com/office/infopath/2007/PartnerControls"/>
+    <ds:schemaRef ds:uri="http://purl.org/dc/elements/1.1/"/>
+    <ds:schemaRef ds:uri="http://schemas.microsoft.com/office/2006/metadata/properties"/>
+    <ds:schemaRef ds:uri="http://www.w3.org/XML/1998/namespace"/>
+    <ds:schemaRef ds:uri="http://purl.org/dc/dcmitype/"/>
+  </ds:schemaRefs>
+</ds:datastoreItem>
 </file>
</xml_diff>